<commit_message>
calendar : planning / view : top, redirection and etc.
</commit_message>
<xml_diff>
--- a/화면구성20190719.pptx
+++ b/화면구성20190719.pptx
@@ -300,7 +300,7 @@
           <a:p>
             <a:fld id="{47D1B0CD-555B-4F37-851B-650B607EE1CA}" type="datetimeFigureOut">
               <a:rPr lang="ko-KR" altLang="en-US" smtClean="0"/>
-              <a:t>2019-07-19</a:t>
+              <a:t>2019-07-22</a:t>
             </a:fld>
             <a:endParaRPr lang="ko-KR" altLang="en-US"/>
           </a:p>
@@ -470,7 +470,7 @@
           <a:p>
             <a:fld id="{47D1B0CD-555B-4F37-851B-650B607EE1CA}" type="datetimeFigureOut">
               <a:rPr lang="ko-KR" altLang="en-US" smtClean="0"/>
-              <a:t>2019-07-19</a:t>
+              <a:t>2019-07-22</a:t>
             </a:fld>
             <a:endParaRPr lang="ko-KR" altLang="en-US"/>
           </a:p>
@@ -650,7 +650,7 @@
           <a:p>
             <a:fld id="{47D1B0CD-555B-4F37-851B-650B607EE1CA}" type="datetimeFigureOut">
               <a:rPr lang="ko-KR" altLang="en-US" smtClean="0"/>
-              <a:t>2019-07-19</a:t>
+              <a:t>2019-07-22</a:t>
             </a:fld>
             <a:endParaRPr lang="ko-KR" altLang="en-US"/>
           </a:p>
@@ -820,7 +820,7 @@
           <a:p>
             <a:fld id="{47D1B0CD-555B-4F37-851B-650B607EE1CA}" type="datetimeFigureOut">
               <a:rPr lang="ko-KR" altLang="en-US" smtClean="0"/>
-              <a:t>2019-07-19</a:t>
+              <a:t>2019-07-22</a:t>
             </a:fld>
             <a:endParaRPr lang="ko-KR" altLang="en-US"/>
           </a:p>
@@ -1066,7 +1066,7 @@
           <a:p>
             <a:fld id="{47D1B0CD-555B-4F37-851B-650B607EE1CA}" type="datetimeFigureOut">
               <a:rPr lang="ko-KR" altLang="en-US" smtClean="0"/>
-              <a:t>2019-07-19</a:t>
+              <a:t>2019-07-22</a:t>
             </a:fld>
             <a:endParaRPr lang="ko-KR" altLang="en-US"/>
           </a:p>
@@ -1354,7 +1354,7 @@
           <a:p>
             <a:fld id="{47D1B0CD-555B-4F37-851B-650B607EE1CA}" type="datetimeFigureOut">
               <a:rPr lang="ko-KR" altLang="en-US" smtClean="0"/>
-              <a:t>2019-07-19</a:t>
+              <a:t>2019-07-22</a:t>
             </a:fld>
             <a:endParaRPr lang="ko-KR" altLang="en-US"/>
           </a:p>
@@ -1776,7 +1776,7 @@
           <a:p>
             <a:fld id="{47D1B0CD-555B-4F37-851B-650B607EE1CA}" type="datetimeFigureOut">
               <a:rPr lang="ko-KR" altLang="en-US" smtClean="0"/>
-              <a:t>2019-07-19</a:t>
+              <a:t>2019-07-22</a:t>
             </a:fld>
             <a:endParaRPr lang="ko-KR" altLang="en-US"/>
           </a:p>
@@ -1894,7 +1894,7 @@
           <a:p>
             <a:fld id="{47D1B0CD-555B-4F37-851B-650B607EE1CA}" type="datetimeFigureOut">
               <a:rPr lang="ko-KR" altLang="en-US" smtClean="0"/>
-              <a:t>2019-07-19</a:t>
+              <a:t>2019-07-22</a:t>
             </a:fld>
             <a:endParaRPr lang="ko-KR" altLang="en-US"/>
           </a:p>
@@ -1989,7 +1989,7 @@
           <a:p>
             <a:fld id="{47D1B0CD-555B-4F37-851B-650B607EE1CA}" type="datetimeFigureOut">
               <a:rPr lang="ko-KR" altLang="en-US" smtClean="0"/>
-              <a:t>2019-07-19</a:t>
+              <a:t>2019-07-22</a:t>
             </a:fld>
             <a:endParaRPr lang="ko-KR" altLang="en-US"/>
           </a:p>
@@ -2266,7 +2266,7 @@
           <a:p>
             <a:fld id="{47D1B0CD-555B-4F37-851B-650B607EE1CA}" type="datetimeFigureOut">
               <a:rPr lang="ko-KR" altLang="en-US" smtClean="0"/>
-              <a:t>2019-07-19</a:t>
+              <a:t>2019-07-22</a:t>
             </a:fld>
             <a:endParaRPr lang="ko-KR" altLang="en-US"/>
           </a:p>
@@ -2519,7 +2519,7 @@
           <a:p>
             <a:fld id="{47D1B0CD-555B-4F37-851B-650B607EE1CA}" type="datetimeFigureOut">
               <a:rPr lang="ko-KR" altLang="en-US" smtClean="0"/>
-              <a:t>2019-07-19</a:t>
+              <a:t>2019-07-22</a:t>
             </a:fld>
             <a:endParaRPr lang="ko-KR" altLang="en-US"/>
           </a:p>
@@ -2732,7 +2732,7 @@
           <a:p>
             <a:fld id="{47D1B0CD-555B-4F37-851B-650B607EE1CA}" type="datetimeFigureOut">
               <a:rPr lang="ko-KR" altLang="en-US" smtClean="0"/>
-              <a:t>2019-07-19</a:t>
+              <a:t>2019-07-22</a:t>
             </a:fld>
             <a:endParaRPr lang="ko-KR" altLang="en-US"/>
           </a:p>
@@ -6141,13 +6141,7 @@
               <a:rPr lang="en-US" altLang="ko-KR" sz="1400" dirty="0" smtClean="0">
                 <a:sym typeface="Wingdings" pitchFamily="2" charset="2"/>
               </a:rPr>
-              <a:t>- </a:t>
-            </a:r>
-            <a:r>
-              <a:rPr lang="en-US" altLang="ko-KR" sz="1400" dirty="0" smtClean="0">
-                <a:sym typeface="Wingdings" pitchFamily="2" charset="2"/>
-              </a:rPr>
-              <a:t>login, register, </a:t>
+              <a:t>- login, register, </a:t>
             </a:r>
             <a:r>
               <a:rPr lang="ko-KR" altLang="en-US" sz="1400" dirty="0" err="1" smtClean="0">
@@ -6485,13 +6479,7 @@
               <a:rPr lang="en-US" altLang="ko-KR" sz="2000" dirty="0" smtClean="0">
                 <a:sym typeface="Wingdings" pitchFamily="2" charset="2"/>
               </a:rPr>
-              <a:t>)</a:t>
-            </a:r>
-            <a:r>
-              <a:rPr lang="en-US" altLang="ko-KR" sz="2000" dirty="0" smtClean="0">
-                <a:sym typeface="Wingdings" pitchFamily="2" charset="2"/>
-              </a:rPr>
-              <a:t>  </a:t>
+              <a:t>)  </a:t>
             </a:r>
             <a:r>
               <a:rPr lang="ko-KR" altLang="en-US" sz="2000" dirty="0" smtClean="0">
@@ -7694,13 +7682,7 @@
               <a:rPr lang="ko-KR" altLang="en-US" sz="1100" dirty="0" err="1" smtClean="0">
                 <a:sym typeface="Wingdings" pitchFamily="2" charset="2"/>
               </a:rPr>
-              <a:t>글작성</a:t>
-            </a:r>
-            <a:r>
-              <a:rPr lang="ko-KR" altLang="en-US" sz="1100" dirty="0" err="1" smtClean="0">
-                <a:sym typeface="Wingdings" pitchFamily="2" charset="2"/>
-              </a:rPr>
-              <a:t>버튼</a:t>
+              <a:t>글작성버튼</a:t>
             </a:r>
             <a:r>
               <a:rPr lang="en-US" altLang="ko-KR" sz="1100" dirty="0" smtClean="0">
@@ -7878,11 +7860,7 @@
             </a:r>
             <a:r>
               <a:rPr lang="ko-KR" altLang="en-US" sz="1050" dirty="0" smtClean="0"/>
-              <a:t>글 </a:t>
-            </a:r>
-            <a:r>
-              <a:rPr lang="ko-KR" altLang="en-US" sz="1050" dirty="0" smtClean="0"/>
-              <a:t>내용표시화면</a:t>
+              <a:t>글 내용표시화면</a:t>
             </a:r>
             <a:endParaRPr lang="en-US" altLang="ko-KR" sz="1050" dirty="0" smtClean="0"/>
           </a:p>
@@ -7901,11 +7879,7 @@
             </a:r>
             <a:r>
               <a:rPr lang="ko-KR" altLang="en-US" sz="1050" dirty="0" smtClean="0"/>
-              <a:t>목록으로 돌아가기 </a:t>
-            </a:r>
-            <a:r>
-              <a:rPr lang="ko-KR" altLang="en-US" sz="1050" dirty="0" smtClean="0"/>
-              <a:t>버</a:t>
+              <a:t>목록으로 돌아가기 버</a:t>
             </a:r>
             <a:r>
               <a:rPr lang="ko-KR" altLang="en-US" sz="1050" dirty="0"/>
@@ -7923,15 +7897,7 @@
             </a:pPr>
             <a:r>
               <a:rPr lang="en-US" altLang="ko-KR" sz="1050" dirty="0" err="1" smtClean="0"/>
-              <a:t>w</a:t>
-            </a:r>
-            <a:r>
-              <a:rPr lang="en-US" altLang="ko-KR" sz="1050" dirty="0" err="1" smtClean="0"/>
-              <a:t>ritearticle</a:t>
-            </a:r>
-            <a:r>
-              <a:rPr lang="en-US" altLang="ko-KR" sz="1050" dirty="0" err="1" smtClean="0"/>
-              <a:t>.jsp</a:t>
+              <a:t>writearticle.jsp</a:t>
             </a:r>
             <a:endParaRPr lang="en-US" altLang="ko-KR" sz="1050" dirty="0" smtClean="0"/>
           </a:p>
@@ -9158,6 +9124,46 @@
               <a:rPr lang="en-US" altLang="ko-KR" sz="1100" dirty="0" err="1" smtClean="0"/>
               <a:t>staffinfo</a:t>
             </a:r>
+            <a:r>
+              <a:rPr lang="en-US" altLang="ko-KR" sz="1100" dirty="0" smtClean="0"/>
+              <a:t>  </a:t>
+            </a:r>
+            <a:r>
+              <a:rPr lang="en-US" altLang="ko-KR" sz="1100" dirty="0" smtClean="0">
+                <a:sym typeface="Wingdings" pitchFamily="2" charset="2"/>
+              </a:rPr>
+              <a:t> calendar, </a:t>
+            </a:r>
+            <a:r>
+              <a:rPr lang="ko-KR" altLang="en-US" sz="1100" dirty="0" err="1" smtClean="0">
+                <a:sym typeface="Wingdings" pitchFamily="2" charset="2"/>
+              </a:rPr>
+              <a:t>직원별</a:t>
+            </a:r>
+            <a:r>
+              <a:rPr lang="en-US" altLang="ko-KR" sz="1100" dirty="0" smtClean="0">
+                <a:sym typeface="Wingdings" pitchFamily="2" charset="2"/>
+              </a:rPr>
+              <a:t>/ </a:t>
+            </a:r>
+            <a:r>
+              <a:rPr lang="ko-KR" altLang="en-US" sz="1100" dirty="0" smtClean="0">
+                <a:sym typeface="Wingdings" pitchFamily="2" charset="2"/>
+              </a:rPr>
+              <a:t>시간대별</a:t>
+            </a:r>
+            <a:r>
+              <a:rPr lang="en-US" altLang="ko-KR" sz="1100" dirty="0" smtClean="0">
+                <a:sym typeface="Wingdings" pitchFamily="2" charset="2"/>
+              </a:rPr>
+              <a:t>/ </a:t>
+            </a:r>
+            <a:r>
+              <a:rPr lang="ko-KR" altLang="en-US" sz="1100" dirty="0" smtClean="0">
+                <a:sym typeface="Wingdings" pitchFamily="2" charset="2"/>
+              </a:rPr>
+              <a:t>전체 일정 캘린더로 표기</a:t>
+            </a:r>
             <a:endParaRPr lang="en-US" altLang="ko-KR" sz="1100" dirty="0" smtClean="0"/>
           </a:p>
           <a:p>
@@ -10032,32 +10038,32 @@
           <a:lstStyle/>
           <a:p>
             <a:r>
-              <a:rPr lang="en-US" altLang="ko-KR" sz="1050" dirty="0" smtClean="0"/>
+              <a:rPr lang="en-US" altLang="ko-KR" sz="1050" strike="sngStrike" dirty="0" smtClean="0"/>
               <a:t>4,5</a:t>
             </a:r>
             <a:r>
-              <a:rPr lang="ko-KR" altLang="en-US" sz="1050" dirty="0" smtClean="0"/>
+              <a:rPr lang="ko-KR" altLang="en-US" sz="1050" strike="sngStrike" dirty="0" smtClean="0"/>
               <a:t>를 합쳐서 게이지 바로 이벤트 바를 생성</a:t>
             </a:r>
             <a:r>
-              <a:rPr lang="en-US" altLang="ko-KR" sz="1050" dirty="0" smtClean="0"/>
+              <a:rPr lang="en-US" altLang="ko-KR" sz="1050" strike="sngStrike" dirty="0" smtClean="0"/>
               <a:t>.</a:t>
             </a:r>
           </a:p>
           <a:p>
             <a:r>
-              <a:rPr lang="ko-KR" altLang="en-US" sz="1050" dirty="0" smtClean="0"/>
+              <a:rPr lang="ko-KR" altLang="en-US" sz="1050" strike="sngStrike" dirty="0" smtClean="0"/>
               <a:t>게이지로 인원 선택</a:t>
             </a:r>
             <a:r>
-              <a:rPr lang="en-US" altLang="ko-KR" sz="1050" dirty="0" smtClean="0"/>
+              <a:rPr lang="en-US" altLang="ko-KR" sz="1050" strike="sngStrike" dirty="0" smtClean="0"/>
               <a:t>.</a:t>
             </a:r>
             <a:r>
-              <a:rPr lang="ko-KR" altLang="en-US" sz="1050" dirty="0" smtClean="0"/>
+              <a:rPr lang="ko-KR" altLang="en-US" sz="1050" strike="sngStrike" dirty="0" smtClean="0"/>
               <a:t> </a:t>
             </a:r>
-            <a:endParaRPr lang="ko-KR" altLang="en-US" sz="1050" dirty="0"/>
+            <a:endParaRPr lang="ko-KR" altLang="en-US" sz="1050" strike="sngStrike" dirty="0"/>
           </a:p>
         </p:txBody>
       </p:sp>
@@ -10110,6 +10116,69 @@
             </a:r>
             <a:r>
               <a:rPr lang="en-US" altLang="ko-KR" sz="1000" dirty="0" smtClean="0"/>
+              <a:t>.</a:t>
+            </a:r>
+            <a:endParaRPr lang="ko-KR" altLang="en-US" sz="1000" dirty="0"/>
+          </a:p>
+        </p:txBody>
+      </p:sp>
+      <p:sp>
+        <p:nvSpPr>
+          <p:cNvPr id="3" name="TextBox 2"/>
+          <p:cNvSpPr txBox="1"/>
+          <p:nvPr/>
+        </p:nvSpPr>
+        <p:spPr>
+          <a:xfrm>
+            <a:off x="323528" y="4305192"/>
+            <a:ext cx="1440160" cy="861774"/>
+          </a:xfrm>
+          <a:prstGeom prst="rect">
+            <a:avLst/>
+          </a:prstGeom>
+          <a:noFill/>
+        </p:spPr>
+        <p:txBody>
+          <a:bodyPr wrap="square" rtlCol="0">
+            <a:spAutoFit/>
+          </a:bodyPr>
+          <a:lstStyle/>
+          <a:p>
+            <a:r>
+              <a:rPr lang="en-US" altLang="ko-KR" sz="1000" dirty="0" smtClean="0"/>
+              <a:t>4,5</a:t>
+            </a:r>
+            <a:r>
+              <a:rPr lang="ko-KR" altLang="en-US" sz="1000" dirty="0" smtClean="0"/>
+              <a:t>를 합쳐 </a:t>
+            </a:r>
+            <a:r>
+              <a:rPr lang="en-US" altLang="ko-KR" sz="1000" dirty="0" err="1" smtClean="0"/>
+              <a:t>bar+spin</a:t>
+            </a:r>
+            <a:r>
+              <a:rPr lang="ko-KR" altLang="en-US" sz="1000" dirty="0" smtClean="0"/>
+              <a:t>버튼으로 구현</a:t>
+            </a:r>
+            <a:r>
+              <a:rPr lang="en-US" altLang="ko-KR" sz="1000" dirty="0" smtClean="0"/>
+              <a:t>.</a:t>
+            </a:r>
+          </a:p>
+          <a:p>
+            <a:endParaRPr lang="en-US" altLang="ko-KR" sz="1000" dirty="0"/>
+          </a:p>
+          <a:p>
+            <a:r>
+              <a:rPr lang="en-US" altLang="ko-KR" sz="1000" dirty="0" smtClean="0"/>
+              <a:t>+ bar </a:t>
+            </a:r>
+            <a:r>
+              <a:rPr lang="ko-KR" altLang="en-US" sz="1000" dirty="0" smtClean="0"/>
+              <a:t>클릭 시 선택되는 기능 필요</a:t>
+            </a:r>
+            <a:r>
+              <a:rPr lang="en-US" altLang="ko-KR" sz="1000" smtClean="0"/>
               <a:t>.</a:t>
             </a:r>
             <a:endParaRPr lang="ko-KR" altLang="en-US" sz="1000" dirty="0"/>

</xml_diff>